<commit_message>
updated presentations and added .pdf
</commit_message>
<xml_diff>
--- a/resources-talk.pptx
+++ b/resources-talk.pptx
@@ -4488,6 +4488,13 @@
   <p:clrMapOvr>
     <a:masterClrMapping/>
   </p:clrMapOvr>
+  <p:timing>
+    <p:tnLst>
+      <p:par>
+        <p:cTn id="1" dur="indefinite" restart="never" nodeType="tmRoot"/>
+      </p:par>
+    </p:tnLst>
+  </p:timing>
 </p:sld>
 </file>
 
@@ -4650,6 +4657,13 @@
   <p:clrMapOvr>
     <a:masterClrMapping/>
   </p:clrMapOvr>
+  <p:timing>
+    <p:tnLst>
+      <p:par>
+        <p:cTn id="1" dur="indefinite" restart="never" nodeType="tmRoot"/>
+      </p:par>
+    </p:tnLst>
+  </p:timing>
 </p:sld>
 </file>
 
@@ -4786,6 +4800,13 @@
   <p:clrMapOvr>
     <a:masterClrMapping/>
   </p:clrMapOvr>
+  <p:timing>
+    <p:tnLst>
+      <p:par>
+        <p:cTn id="1" dur="indefinite" restart="never" nodeType="tmRoot"/>
+      </p:par>
+    </p:tnLst>
+  </p:timing>
 </p:sld>
 </file>
 
@@ -4879,6 +4900,13 @@
   <p:clrMapOvr>
     <a:masterClrMapping/>
   </p:clrMapOvr>
+  <p:timing>
+    <p:tnLst>
+      <p:par>
+        <p:cTn id="1" dur="indefinite" restart="never" nodeType="tmRoot"/>
+      </p:par>
+    </p:tnLst>
+  </p:timing>
 </p:sld>
 </file>
 
@@ -5154,6 +5182,13 @@
   <p:clrMapOvr>
     <a:masterClrMapping/>
   </p:clrMapOvr>
+  <p:timing>
+    <p:tnLst>
+      <p:par>
+        <p:cTn id="1" dur="indefinite" restart="never" nodeType="tmRoot"/>
+      </p:par>
+    </p:tnLst>
+  </p:timing>
 </p:sld>
 </file>
 
@@ -5525,6 +5560,13 @@
   <p:clrMapOvr>
     <a:masterClrMapping/>
   </p:clrMapOvr>
+  <p:timing>
+    <p:tnLst>
+      <p:par>
+        <p:cTn id="1" dur="indefinite" restart="never" nodeType="tmRoot"/>
+      </p:par>
+    </p:tnLst>
+  </p:timing>
 </p:sld>
 </file>
 
@@ -5796,6 +5838,13 @@
   <p:clrMapOvr>
     <a:masterClrMapping/>
   </p:clrMapOvr>
+  <p:timing>
+    <p:tnLst>
+      <p:par>
+        <p:cTn id="1" dur="indefinite" restart="never" nodeType="tmRoot"/>
+      </p:par>
+    </p:tnLst>
+  </p:timing>
 </p:sld>
 </file>
 
@@ -6238,6 +6287,13 @@
   <p:clrMapOvr>
     <a:masterClrMapping/>
   </p:clrMapOvr>
+  <p:timing>
+    <p:tnLst>
+      <p:par>
+        <p:cTn id="1" dur="indefinite" restart="never" nodeType="tmRoot"/>
+      </p:par>
+    </p:tnLst>
+  </p:timing>
 </p:sld>
 </file>
 
@@ -6320,6 +6376,13 @@
   <p:clrMapOvr>
     <a:masterClrMapping/>
   </p:clrMapOvr>
+  <p:timing>
+    <p:tnLst>
+      <p:par>
+        <p:cTn id="1" dur="indefinite" restart="never" nodeType="tmRoot"/>
+      </p:par>
+    </p:tnLst>
+  </p:timing>
 </p:sld>
 </file>
 
@@ -6446,6 +6509,13 @@
   <p:clrMapOvr>
     <a:masterClrMapping/>
   </p:clrMapOvr>
+  <p:timing>
+    <p:tnLst>
+      <p:par>
+        <p:cTn id="1" dur="indefinite" restart="never" nodeType="tmRoot"/>
+      </p:par>
+    </p:tnLst>
+  </p:timing>
 </p:sld>
 </file>
 
@@ -6576,6 +6646,13 @@
   <p:clrMapOvr>
     <a:masterClrMapping/>
   </p:clrMapOvr>
+  <p:timing>
+    <p:tnLst>
+      <p:par>
+        <p:cTn id="1" dur="indefinite" restart="never" nodeType="tmRoot"/>
+      </p:par>
+    </p:tnLst>
+  </p:timing>
 </p:sld>
 </file>
 
@@ -6684,6 +6761,13 @@
   <p:clrMapOvr>
     <a:masterClrMapping/>
   </p:clrMapOvr>
+  <p:timing>
+    <p:tnLst>
+      <p:par>
+        <p:cTn id="1" dur="indefinite" restart="never" nodeType="tmRoot"/>
+      </p:par>
+    </p:tnLst>
+  </p:timing>
 </p:sld>
 </file>
 
@@ -6948,6 +7032,13 @@
   <p:clrMapOvr>
     <a:masterClrMapping/>
   </p:clrMapOvr>
+  <p:timing>
+    <p:tnLst>
+      <p:par>
+        <p:cTn id="1" dur="indefinite" restart="never" nodeType="tmRoot"/>
+      </p:par>
+    </p:tnLst>
+  </p:timing>
 </p:sld>
 </file>
 
@@ -7085,6 +7176,13 @@
   <p:clrMapOvr>
     <a:masterClrMapping/>
   </p:clrMapOvr>
+  <p:timing>
+    <p:tnLst>
+      <p:par>
+        <p:cTn id="1" dur="indefinite" restart="never" nodeType="tmRoot"/>
+      </p:par>
+    </p:tnLst>
+  </p:timing>
 </p:sld>
 </file>
 
@@ -7336,6 +7434,13 @@
   <p:clrMapOvr>
     <a:masterClrMapping/>
   </p:clrMapOvr>
+  <p:timing>
+    <p:tnLst>
+      <p:par>
+        <p:cTn id="1" dur="indefinite" restart="never" nodeType="tmRoot"/>
+      </p:par>
+    </p:tnLst>
+  </p:timing>
 </p:sld>
 </file>
 
@@ -7420,6 +7525,13 @@
   <p:clrMapOvr>
     <a:masterClrMapping/>
   </p:clrMapOvr>
+  <p:timing>
+    <p:tnLst>
+      <p:par>
+        <p:cTn id="1" dur="indefinite" restart="never" nodeType="tmRoot"/>
+      </p:par>
+    </p:tnLst>
+  </p:timing>
 </p:sld>
 </file>
 
@@ -7614,6 +7726,13 @@
   <p:clrMapOvr>
     <a:masterClrMapping/>
   </p:clrMapOvr>
+  <p:timing>
+    <p:tnLst>
+      <p:par>
+        <p:cTn id="1" dur="indefinite" restart="never" nodeType="tmRoot"/>
+      </p:par>
+    </p:tnLst>
+  </p:timing>
 </p:sld>
 </file>
 
@@ -7756,6 +7875,13 @@
   <p:clrMapOvr>
     <a:masterClrMapping/>
   </p:clrMapOvr>
+  <p:timing>
+    <p:tnLst>
+      <p:par>
+        <p:cTn id="1" dur="indefinite" restart="never" nodeType="tmRoot"/>
+      </p:par>
+    </p:tnLst>
+  </p:timing>
 </p:sld>
 </file>
 
@@ -8018,6 +8144,13 @@
   <p:clrMapOvr>
     <a:masterClrMapping/>
   </p:clrMapOvr>
+  <p:timing>
+    <p:tnLst>
+      <p:par>
+        <p:cTn id="1" dur="indefinite" restart="never" nodeType="tmRoot"/>
+      </p:par>
+    </p:tnLst>
+  </p:timing>
 </p:sld>
 </file>
 
@@ -8159,6 +8292,13 @@
   <p:clrMapOvr>
     <a:masterClrMapping/>
   </p:clrMapOvr>
+  <p:timing>
+    <p:tnLst>
+      <p:par>
+        <p:cTn id="1" dur="indefinite" restart="never" nodeType="tmRoot"/>
+      </p:par>
+    </p:tnLst>
+  </p:timing>
 </p:sld>
 </file>
 
@@ -8236,6 +8376,13 @@
   <p:clrMapOvr>
     <a:masterClrMapping/>
   </p:clrMapOvr>
+  <p:timing>
+    <p:tnLst>
+      <p:par>
+        <p:cTn id="1" dur="indefinite" restart="never" nodeType="tmRoot"/>
+      </p:par>
+    </p:tnLst>
+  </p:timing>
 </p:sld>
 </file>
 
@@ -8307,6 +8454,13 @@
   <p:clrMapOvr>
     <a:masterClrMapping/>
   </p:clrMapOvr>
+  <p:timing>
+    <p:tnLst>
+      <p:par>
+        <p:cTn id="1" dur="indefinite" restart="never" nodeType="tmRoot"/>
+      </p:par>
+    </p:tnLst>
+  </p:timing>
 </p:sld>
 </file>
 
@@ -8411,6 +8565,13 @@
   <p:clrMapOvr>
     <a:masterClrMapping/>
   </p:clrMapOvr>
+  <p:timing>
+    <p:tnLst>
+      <p:par>
+        <p:cTn id="1" dur="indefinite" restart="never" nodeType="tmRoot"/>
+      </p:par>
+    </p:tnLst>
+  </p:timing>
 </p:sld>
 </file>
 
@@ -8539,6 +8700,13 @@
   <p:clrMapOvr>
     <a:masterClrMapping/>
   </p:clrMapOvr>
+  <p:timing>
+    <p:tnLst>
+      <p:par>
+        <p:cTn id="1" dur="indefinite" restart="never" nodeType="tmRoot"/>
+      </p:par>
+    </p:tnLst>
+  </p:timing>
 </p:sld>
 </file>
 
@@ -8702,6 +8870,13 @@
   <p:clrMapOvr>
     <a:masterClrMapping/>
   </p:clrMapOvr>
+  <p:timing>
+    <p:tnLst>
+      <p:par>
+        <p:cTn id="1" dur="indefinite" restart="never" nodeType="tmRoot"/>
+      </p:par>
+    </p:tnLst>
+  </p:timing>
 </p:sld>
 </file>
 
@@ -8845,6 +9020,13 @@
   <p:clrMapOvr>
     <a:masterClrMapping/>
   </p:clrMapOvr>
+  <p:timing>
+    <p:tnLst>
+      <p:par>
+        <p:cTn id="1" dur="indefinite" restart="never" nodeType="tmRoot"/>
+      </p:par>
+    </p:tnLst>
+  </p:timing>
 </p:sld>
 </file>
 
@@ -8958,6 +9140,13 @@
   <p:clrMapOvr>
     <a:masterClrMapping/>
   </p:clrMapOvr>
+  <p:timing>
+    <p:tnLst>
+      <p:par>
+        <p:cTn id="1" dur="indefinite" restart="never" nodeType="tmRoot"/>
+      </p:par>
+    </p:tnLst>
+  </p:timing>
 </p:sld>
 </file>
 
@@ -9114,6 +9303,13 @@
   <p:clrMapOvr>
     <a:masterClrMapping/>
   </p:clrMapOvr>
+  <p:timing>
+    <p:tnLst>
+      <p:par>
+        <p:cTn id="1" dur="indefinite" restart="never" nodeType="tmRoot"/>
+      </p:par>
+    </p:tnLst>
+  </p:timing>
 </p:sld>
 </file>
 
@@ -9260,6 +9456,13 @@
   <p:clrMapOvr>
     <a:masterClrMapping/>
   </p:clrMapOvr>
+  <p:timing>
+    <p:tnLst>
+      <p:par>
+        <p:cTn id="1" dur="indefinite" restart="never" nodeType="tmRoot"/>
+      </p:par>
+    </p:tnLst>
+  </p:timing>
 </p:sld>
 </file>
 
@@ -9330,6 +9533,13 @@
   <p:clrMapOvr>
     <a:masterClrMapping/>
   </p:clrMapOvr>
+  <p:timing>
+    <p:tnLst>
+      <p:par>
+        <p:cTn id="1" dur="indefinite" restart="never" nodeType="tmRoot"/>
+      </p:par>
+    </p:tnLst>
+  </p:timing>
 </p:sld>
 </file>
 
@@ -9554,6 +9764,13 @@
   <p:clrMapOvr>
     <a:masterClrMapping/>
   </p:clrMapOvr>
+  <p:timing>
+    <p:tnLst>
+      <p:par>
+        <p:cTn id="1" dur="indefinite" restart="never" nodeType="tmRoot"/>
+      </p:par>
+    </p:tnLst>
+  </p:timing>
 </p:sld>
 </file>
 
@@ -9760,6 +9977,13 @@
   <p:clrMapOvr>
     <a:masterClrMapping/>
   </p:clrMapOvr>
+  <p:timing>
+    <p:tnLst>
+      <p:par>
+        <p:cTn id="1" dur="indefinite" restart="never" nodeType="tmRoot"/>
+      </p:par>
+    </p:tnLst>
+  </p:timing>
 </p:sld>
 </file>
 
@@ -9831,6 +10055,13 @@
   <p:clrMapOvr>
     <a:masterClrMapping/>
   </p:clrMapOvr>
+  <p:timing>
+    <p:tnLst>
+      <p:par>
+        <p:cTn id="1" dur="indefinite" restart="never" nodeType="tmRoot"/>
+      </p:par>
+    </p:tnLst>
+  </p:timing>
 </p:sld>
 </file>
 
@@ -9910,6 +10141,13 @@
   <p:clrMapOvr>
     <a:masterClrMapping/>
   </p:clrMapOvr>
+  <p:timing>
+    <p:tnLst>
+      <p:par>
+        <p:cTn id="1" dur="indefinite" restart="never" nodeType="tmRoot"/>
+      </p:par>
+    </p:tnLst>
+  </p:timing>
 </p:sld>
 </file>
 
@@ -10162,6 +10400,13 @@
   <p:clrMapOvr>
     <a:masterClrMapping/>
   </p:clrMapOvr>
+  <p:timing>
+    <p:tnLst>
+      <p:par>
+        <p:cTn id="1" dur="indefinite" restart="never" nodeType="tmRoot"/>
+      </p:par>
+    </p:tnLst>
+  </p:timing>
 </p:sld>
 </file>
 
@@ -10269,6 +10514,13 @@
   <p:clrMapOvr>
     <a:masterClrMapping/>
   </p:clrMapOvr>
+  <p:timing>
+    <p:tnLst>
+      <p:par>
+        <p:cTn id="1" dur="indefinite" restart="never" nodeType="tmRoot"/>
+      </p:par>
+    </p:tnLst>
+  </p:timing>
 </p:sld>
 </file>
 
@@ -10483,6 +10735,13 @@
   <p:clrMapOvr>
     <a:masterClrMapping/>
   </p:clrMapOvr>
+  <p:timing>
+    <p:tnLst>
+      <p:par>
+        <p:cTn id="1" dur="indefinite" restart="never" nodeType="tmRoot"/>
+      </p:par>
+    </p:tnLst>
+  </p:timing>
 </p:sld>
 </file>
 
@@ -10564,6 +10823,13 @@
   <p:clrMapOvr>
     <a:masterClrMapping/>
   </p:clrMapOvr>
+  <p:timing>
+    <p:tnLst>
+      <p:par>
+        <p:cTn id="1" dur="indefinite" restart="never" nodeType="tmRoot"/>
+      </p:par>
+    </p:tnLst>
+  </p:timing>
 </p:sld>
 </file>
 
@@ -10921,6 +11187,13 @@
   <p:clrMapOvr>
     <a:masterClrMapping/>
   </p:clrMapOvr>
+  <p:timing>
+    <p:tnLst>
+      <p:par>
+        <p:cTn id="1" dur="indefinite" restart="never" nodeType="tmRoot"/>
+      </p:par>
+    </p:tnLst>
+  </p:timing>
 </p:sld>
 </file>
 
@@ -11107,6 +11380,13 @@
   <p:clrMapOvr>
     <a:masterClrMapping/>
   </p:clrMapOvr>
+  <p:timing>
+    <p:tnLst>
+      <p:par>
+        <p:cTn id="1" dur="indefinite" restart="never" nodeType="tmRoot"/>
+      </p:par>
+    </p:tnLst>
+  </p:timing>
 </p:sld>
 </file>
 
@@ -11190,6 +11470,13 @@
   <p:clrMapOvr>
     <a:masterClrMapping/>
   </p:clrMapOvr>
+  <p:timing>
+    <p:tnLst>
+      <p:par>
+        <p:cTn id="1" dur="indefinite" restart="never" nodeType="tmRoot"/>
+      </p:par>
+    </p:tnLst>
+  </p:timing>
 </p:sld>
 </file>
 
@@ -11254,30 +11541,28 @@
         <p:spPr/>
         <p:txBody>
           <a:bodyPr>
-            <a:normAutofit fontScale="32500" lnSpcReduction="20000"/>
+            <a:noAutofit/>
           </a:bodyPr>
           <a:lstStyle/>
           <a:p>
             <a:pPr>
               <a:buNone/>
             </a:pPr>
-            <a:endParaRPr lang="en-US" dirty="0" smtClean="0"/>
-          </a:p>
-          <a:p>
-            <a:pPr>
-              <a:buNone/>
-            </a:pPr>
-            <a:r>
-              <a:rPr lang="en-US" dirty="0" smtClean="0"/>
-              <a:t>modules = {</a:t>
-            </a:r>
-          </a:p>
-          <a:p>
-            <a:pPr>
-              <a:buNone/>
-            </a:pPr>
-            <a:r>
-              <a:rPr lang="en-US" dirty="0" smtClean="0"/>
+            <a:r>
+              <a:rPr lang="en-US" sz="1000" dirty="0" smtClean="0"/>
+              <a:t>modules </a:t>
+            </a:r>
+            <a:r>
+              <a:rPr lang="en-US" sz="1000" dirty="0" smtClean="0"/>
+              <a:t>= {</a:t>
+            </a:r>
+          </a:p>
+          <a:p>
+            <a:pPr>
+              <a:buNone/>
+            </a:pPr>
+            <a:r>
+              <a:rPr lang="en-US" sz="1000" dirty="0" smtClean="0"/>
               <a:t>	modernizr {</a:t>
             </a:r>
           </a:p>
@@ -11286,15 +11571,15 @@
               <a:buNone/>
             </a:pPr>
             <a:r>
-              <a:rPr lang="en-US" dirty="0" smtClean="0"/>
+              <a:rPr lang="en-US" sz="1000" dirty="0" smtClean="0"/>
               <a:t>		defaultBundle '</a:t>
             </a:r>
             <a:r>
-              <a:rPr lang="en-US" dirty="0" err="1" smtClean="0"/>
+              <a:rPr lang="en-US" sz="1000" dirty="0" err="1" smtClean="0"/>
               <a:t>ui</a:t>
             </a:r>
             <a:r>
-              <a:rPr lang="en-US" dirty="0" smtClean="0"/>
+              <a:rPr lang="en-US" sz="1000" dirty="0" smtClean="0"/>
               <a:t>'</a:t>
             </a:r>
           </a:p>
@@ -11303,7 +11588,7 @@
               <a:buNone/>
             </a:pPr>
             <a:r>
-              <a:rPr lang="en-US" dirty="0" smtClean="0"/>
+              <a:rPr lang="en-US" sz="1000" dirty="0" smtClean="0"/>
               <a:t>		resource url:'js/modernizr-2.5.2.js', disposition: 'head'</a:t>
             </a:r>
           </a:p>
@@ -11312,7 +11597,7 @@
               <a:buNone/>
             </a:pPr>
             <a:r>
-              <a:rPr lang="en-US" dirty="0" smtClean="0"/>
+              <a:rPr lang="en-US" sz="1000" dirty="0" smtClean="0"/>
               <a:t>	}</a:t>
             </a:r>
           </a:p>
@@ -11321,7 +11606,7 @@
               <a:buNone/>
             </a:pPr>
             <a:r>
-              <a:rPr lang="en-US" dirty="0" smtClean="0"/>
+              <a:rPr lang="en-US" sz="1000" dirty="0" smtClean="0"/>
               <a:t>	backbone {</a:t>
             </a:r>
           </a:p>
@@ -11330,15 +11615,15 @@
               <a:buNone/>
             </a:pPr>
             <a:r>
-              <a:rPr lang="en-US" dirty="0" smtClean="0"/>
+              <a:rPr lang="en-US" sz="1000" dirty="0" smtClean="0"/>
               <a:t>		defaultBundle '</a:t>
             </a:r>
             <a:r>
-              <a:rPr lang="en-US" dirty="0" err="1" smtClean="0"/>
+              <a:rPr lang="en-US" sz="1000" dirty="0" err="1" smtClean="0"/>
               <a:t>ui</a:t>
             </a:r>
             <a:r>
-              <a:rPr lang="en-US" dirty="0" smtClean="0"/>
+              <a:rPr lang="en-US" sz="1000" dirty="0" smtClean="0"/>
               <a:t>'</a:t>
             </a:r>
           </a:p>
@@ -11347,7 +11632,7 @@
               <a:buNone/>
             </a:pPr>
             <a:r>
-              <a:rPr lang="en-US" dirty="0" smtClean="0"/>
+              <a:rPr lang="en-US" sz="1000" dirty="0" smtClean="0"/>
               <a:t>		resource url:'js/underscore-1.3.3.js'</a:t>
             </a:r>
           </a:p>
@@ -11356,7 +11641,7 @@
               <a:buNone/>
             </a:pPr>
             <a:r>
-              <a:rPr lang="en-US" dirty="0" smtClean="0"/>
+              <a:rPr lang="en-US" sz="1000" dirty="0" smtClean="0"/>
               <a:t>		resource url:'js/backbone-0.9.2.js'</a:t>
             </a:r>
           </a:p>
@@ -11365,7 +11650,7 @@
               <a:buNone/>
             </a:pPr>
             <a:r>
-              <a:rPr lang="en-US" dirty="0" smtClean="0"/>
+              <a:rPr lang="en-US" sz="1000" dirty="0" smtClean="0"/>
               <a:t>		resource url:'js/handlebars-1.0.0.beta.6.js'</a:t>
             </a:r>
           </a:p>
@@ -11374,7 +11659,7 @@
               <a:buNone/>
             </a:pPr>
             <a:r>
-              <a:rPr lang="en-US" dirty="0" smtClean="0"/>
+              <a:rPr lang="en-US" sz="1000" dirty="0" smtClean="0"/>
               <a:t>	}</a:t>
             </a:r>
           </a:p>
@@ -11383,7 +11668,7 @@
               <a:buNone/>
             </a:pPr>
             <a:r>
-              <a:rPr lang="en-US" dirty="0" smtClean="0"/>
+              <a:rPr lang="en-US" sz="1000" dirty="0" smtClean="0"/>
               <a:t>	site6 {</a:t>
             </a:r>
           </a:p>
@@ -11392,11 +11677,11 @@
               <a:buNone/>
             </a:pPr>
             <a:r>
-              <a:rPr lang="en-US" dirty="0" smtClean="0"/>
+              <a:rPr lang="en-US" sz="1000" dirty="0" smtClean="0"/>
               <a:t>		</a:t>
             </a:r>
             <a:r>
-              <a:rPr lang="en-US" dirty="0" smtClean="0">
+              <a:rPr lang="en-US" sz="1000" dirty="0" smtClean="0">
                 <a:solidFill>
                   <a:srgbClr val="FF0000"/>
                 </a:solidFill>
@@ -11409,15 +11694,15 @@
               <a:buNone/>
             </a:pPr>
             <a:r>
-              <a:rPr lang="en-US" dirty="0" smtClean="0"/>
+              <a:rPr lang="en-US" sz="1000" dirty="0" smtClean="0"/>
               <a:t>		defaultBundle '</a:t>
             </a:r>
             <a:r>
-              <a:rPr lang="en-US" dirty="0" err="1" smtClean="0"/>
+              <a:rPr lang="en-US" sz="1000" dirty="0" err="1" smtClean="0"/>
               <a:t>ui</a:t>
             </a:r>
             <a:r>
-              <a:rPr lang="en-US" dirty="0" smtClean="0"/>
+              <a:rPr lang="en-US" sz="1000" dirty="0" smtClean="0"/>
               <a:t>'</a:t>
             </a:r>
           </a:p>
@@ -11426,7 +11711,7 @@
               <a:buNone/>
             </a:pPr>
             <a:r>
-              <a:rPr lang="en-US" dirty="0" smtClean="0"/>
+              <a:rPr lang="en-US" sz="1000" dirty="0" smtClean="0"/>
               <a:t>		resource url:'css/widget1.css'</a:t>
             </a:r>
           </a:p>
@@ -11435,7 +11720,7 @@
               <a:buNone/>
             </a:pPr>
             <a:r>
-              <a:rPr lang="en-US" dirty="0" smtClean="0"/>
+              <a:rPr lang="en-US" sz="1000" dirty="0" smtClean="0"/>
               <a:t>		resource url:'css/widget2.css'</a:t>
             </a:r>
           </a:p>
@@ -11444,7 +11729,7 @@
               <a:buNone/>
             </a:pPr>
             <a:r>
-              <a:rPr lang="en-US" dirty="0" smtClean="0"/>
+              <a:rPr lang="en-US" sz="1000" dirty="0" smtClean="0"/>
               <a:t>		resource url:'css/widget3.css'</a:t>
             </a:r>
           </a:p>
@@ -11453,7 +11738,7 @@
               <a:buNone/>
             </a:pPr>
             <a:r>
-              <a:rPr lang="en-US" dirty="0" smtClean="0"/>
+              <a:rPr lang="en-US" sz="1000" dirty="0" smtClean="0"/>
               <a:t>		resource url:'css/widget4.css'</a:t>
             </a:r>
           </a:p>
@@ -11462,7 +11747,7 @@
               <a:buNone/>
             </a:pPr>
             <a:r>
-              <a:rPr lang="en-US" dirty="0" smtClean="0"/>
+              <a:rPr lang="en-US" sz="1000" dirty="0" smtClean="0"/>
               <a:t>		resource url:'js/jquery-1.7.2.js'</a:t>
             </a:r>
           </a:p>
@@ -11471,7 +11756,7 @@
               <a:buNone/>
             </a:pPr>
             <a:r>
-              <a:rPr lang="en-US" dirty="0" smtClean="0"/>
+              <a:rPr lang="en-US" sz="1000" dirty="0" smtClean="0"/>
               <a:t>		resource url:'js/jasmine-1.2.0.js'</a:t>
             </a:r>
           </a:p>
@@ -11480,7 +11765,7 @@
               <a:buNone/>
             </a:pPr>
             <a:r>
-              <a:rPr lang="en-US" dirty="0" smtClean="0"/>
+              <a:rPr lang="en-US" sz="1000" dirty="0" smtClean="0"/>
               <a:t>		resource url:'js/index-1.0.0.js'</a:t>
             </a:r>
           </a:p>
@@ -11489,7 +11774,7 @@
               <a:buNone/>
             </a:pPr>
             <a:r>
-              <a:rPr lang="en-US" dirty="0" smtClean="0"/>
+              <a:rPr lang="en-US" sz="1000" dirty="0" smtClean="0"/>
               <a:t>	}</a:t>
             </a:r>
           </a:p>
@@ -11498,7 +11783,7 @@
               <a:buNone/>
             </a:pPr>
             <a:r>
-              <a:rPr lang="en-US" dirty="0" smtClean="0"/>
+              <a:rPr lang="en-US" sz="1000" dirty="0" smtClean="0"/>
               <a:t>}</a:t>
             </a:r>
           </a:p>
@@ -11509,6 +11794,13 @@
   <p:clrMapOvr>
     <a:masterClrMapping/>
   </p:clrMapOvr>
+  <p:timing>
+    <p:tnLst>
+      <p:par>
+        <p:cTn id="1" dur="indefinite" restart="never" nodeType="tmRoot"/>
+      </p:par>
+    </p:tnLst>
+  </p:timing>
 </p:sld>
 </file>
 
@@ -11602,6 +11894,13 @@
   <p:clrMapOvr>
     <a:masterClrMapping/>
   </p:clrMapOvr>
+  <p:timing>
+    <p:tnLst>
+      <p:par>
+        <p:cTn id="1" dur="indefinite" restart="never" nodeType="tmRoot"/>
+      </p:par>
+    </p:tnLst>
+  </p:timing>
 </p:sld>
 </file>
 
@@ -11788,6 +12087,13 @@
   <p:clrMapOvr>
     <a:masterClrMapping/>
   </p:clrMapOvr>
+  <p:timing>
+    <p:tnLst>
+      <p:par>
+        <p:cTn id="1" dur="indefinite" restart="never" nodeType="tmRoot"/>
+      </p:par>
+    </p:tnLst>
+  </p:timing>
 </p:sld>
 </file>
 
@@ -11889,6 +12195,13 @@
   <p:clrMapOvr>
     <a:masterClrMapping/>
   </p:clrMapOvr>
+  <p:timing>
+    <p:tnLst>
+      <p:par>
+        <p:cTn id="1" dur="indefinite" restart="never" nodeType="tmRoot"/>
+      </p:par>
+    </p:tnLst>
+  </p:timing>
 </p:sld>
 </file>
 
@@ -12011,6 +12324,13 @@
   <p:clrMapOvr>
     <a:masterClrMapping/>
   </p:clrMapOvr>
+  <p:timing>
+    <p:tnLst>
+      <p:par>
+        <p:cTn id="1" dur="indefinite" restart="never" nodeType="tmRoot"/>
+      </p:par>
+    </p:tnLst>
+  </p:timing>
 </p:sld>
 </file>
 
@@ -12152,6 +12472,13 @@
   <p:clrMapOvr>
     <a:masterClrMapping/>
   </p:clrMapOvr>
+  <p:timing>
+    <p:tnLst>
+      <p:par>
+        <p:cTn id="1" dur="indefinite" restart="never" nodeType="tmRoot"/>
+      </p:par>
+    </p:tnLst>
+  </p:timing>
 </p:sld>
 </file>
 
@@ -12256,6 +12583,13 @@
   <p:clrMapOvr>
     <a:masterClrMapping/>
   </p:clrMapOvr>
+  <p:timing>
+    <p:tnLst>
+      <p:par>
+        <p:cTn id="1" dur="indefinite" restart="never" nodeType="tmRoot"/>
+      </p:par>
+    </p:tnLst>
+  </p:timing>
 </p:sld>
 </file>
 
@@ -12347,6 +12681,13 @@
   <p:clrMapOvr>
     <a:masterClrMapping/>
   </p:clrMapOvr>
+  <p:timing>
+    <p:tnLst>
+      <p:par>
+        <p:cTn id="1" dur="indefinite" restart="never" nodeType="tmRoot"/>
+      </p:par>
+    </p:tnLst>
+  </p:timing>
 </p:sld>
 </file>
 
@@ -12436,6 +12777,13 @@
   <p:clrMapOvr>
     <a:masterClrMapping/>
   </p:clrMapOvr>
+  <p:timing>
+    <p:tnLst>
+      <p:par>
+        <p:cTn id="1" dur="indefinite" restart="never" nodeType="tmRoot"/>
+      </p:par>
+    </p:tnLst>
+  </p:timing>
 </p:sld>
 </file>
 
@@ -12536,6 +12884,13 @@
   <p:clrMapOvr>
     <a:masterClrMapping/>
   </p:clrMapOvr>
+  <p:timing>
+    <p:tnLst>
+      <p:par>
+        <p:cTn id="1" dur="indefinite" restart="never" nodeType="tmRoot"/>
+      </p:par>
+    </p:tnLst>
+  </p:timing>
 </p:sld>
 </file>
 

</xml_diff>